<commit_message>
Suppression .htacces pour test
</commit_message>
<xml_diff>
--- a/annexe/Rapport d’optimisation SEO.pptx
+++ b/annexe/Rapport d’optimisation SEO.pptx
@@ -122,6 +122,11 @@
       </a:defRPr>
     </a:lvl9pPr>
   </p:defaultTextStyle>
+  <p:extLst>
+    <p:ext uri="{EFAFB233-063F-42B5-8137-9DF3F51BA10A}">
+      <p15:sldGuideLst xmlns:p15="http://schemas.microsoft.com/office/powerpoint/2012/main"/>
+    </p:ext>
+  </p:extLst>
 </p:presentation>
 </file>
 
@@ -207,7 +212,7 @@
           <a:p>
             <a:fld id="{C035DD28-074E-46BB-BB2A-B386588DC0A3}" type="datetimeFigureOut">
               <a:rPr lang="fr-FR" smtClean="0"/>
-              <a:t>11/05/2022</a:t>
+              <a:t>12/05/2022</a:t>
             </a:fld>
             <a:endParaRPr lang="fr-FR"/>
           </a:p>
@@ -701,7 +706,7 @@
           <a:p>
             <a:fld id="{232284FA-CDEF-47C7-9649-825EF76D837B}" type="datetime1">
               <a:rPr lang="fr-FR" smtClean="0"/>
-              <a:t>11/05/2022</a:t>
+              <a:t>12/05/2022</a:t>
             </a:fld>
             <a:endParaRPr lang="fr-FR"/>
           </a:p>
@@ -913,7 +918,7 @@
           <a:p>
             <a:fld id="{EB939044-10EE-4D69-A637-FE5668AB6566}" type="datetime1">
               <a:rPr lang="fr-FR" smtClean="0"/>
-              <a:t>11/05/2022</a:t>
+              <a:t>12/05/2022</a:t>
             </a:fld>
             <a:endParaRPr lang="fr-FR"/>
           </a:p>
@@ -1173,7 +1178,7 @@
           <a:p>
             <a:fld id="{F369904B-BFA1-4CB6-9D36-E6A5662F326C}" type="datetime1">
               <a:rPr lang="fr-FR" smtClean="0"/>
-              <a:t>11/05/2022</a:t>
+              <a:t>12/05/2022</a:t>
             </a:fld>
             <a:endParaRPr lang="fr-FR"/>
           </a:p>
@@ -1351,7 +1356,7 @@
           <a:p>
             <a:fld id="{0730848C-3CE0-4CC2-8087-EC38CC86EF6C}" type="datetime1">
               <a:rPr lang="fr-FR" smtClean="0"/>
-              <a:t>11/05/2022</a:t>
+              <a:t>12/05/2022</a:t>
             </a:fld>
             <a:endParaRPr lang="fr-FR"/>
           </a:p>
@@ -1690,7 +1695,7 @@
           <a:p>
             <a:fld id="{B8A20B26-26B4-45B0-877C-13FC14AC82B7}" type="datetime1">
               <a:rPr lang="fr-FR" smtClean="0"/>
-              <a:t>11/05/2022</a:t>
+              <a:t>12/05/2022</a:t>
             </a:fld>
             <a:endParaRPr lang="fr-FR"/>
           </a:p>
@@ -1969,7 +1974,7 @@
           <a:p>
             <a:fld id="{53AE2F20-6291-4792-A678-9329E1F4619E}" type="datetime1">
               <a:rPr lang="fr-FR" smtClean="0"/>
-              <a:t>11/05/2022</a:t>
+              <a:t>12/05/2022</a:t>
             </a:fld>
             <a:endParaRPr lang="fr-FR"/>
           </a:p>
@@ -2352,7 +2357,7 @@
           <a:p>
             <a:fld id="{8389FEA3-8F85-4BE5-838D-F7E922FC5021}" type="datetime1">
               <a:rPr lang="fr-FR" smtClean="0"/>
-              <a:t>11/05/2022</a:t>
+              <a:t>12/05/2022</a:t>
             </a:fld>
             <a:endParaRPr lang="fr-FR"/>
           </a:p>
@@ -2474,7 +2479,7 @@
           <a:p>
             <a:fld id="{77D894C5-B7FD-4313-AAD5-DF6E83B03D2E}" type="datetime1">
               <a:rPr lang="fr-FR" smtClean="0"/>
-              <a:t>11/05/2022</a:t>
+              <a:t>12/05/2022</a:t>
             </a:fld>
             <a:endParaRPr lang="fr-FR"/>
           </a:p>
@@ -2649,7 +2654,7 @@
           <a:p>
             <a:fld id="{75D5CE15-306C-42B4-8642-07A657F9B459}" type="datetime1">
               <a:rPr lang="fr-FR" smtClean="0"/>
-              <a:t>11/05/2022</a:t>
+              <a:t>12/05/2022</a:t>
             </a:fld>
             <a:endParaRPr lang="fr-FR"/>
           </a:p>
@@ -3007,7 +3012,7 @@
           <a:p>
             <a:fld id="{78AB5598-D849-4415-AE3D-BC67E0104DD1}" type="datetime1">
               <a:rPr lang="fr-FR" smtClean="0"/>
-              <a:t>11/05/2022</a:t>
+              <a:t>12/05/2022</a:t>
             </a:fld>
             <a:endParaRPr lang="fr-FR"/>
           </a:p>
@@ -3393,7 +3398,7 @@
           <a:p>
             <a:fld id="{536DC368-B62D-4E14-ADCA-2529D5A64AA9}" type="datetime1">
               <a:rPr lang="fr-FR" smtClean="0"/>
-              <a:t>11/05/2022</a:t>
+              <a:t>12/05/2022</a:t>
             </a:fld>
             <a:endParaRPr lang="fr-FR"/>
           </a:p>
@@ -3684,7 +3689,7 @@
           <a:p>
             <a:fld id="{62171F59-CF8D-4AD7-B611-51121FD54B58}" type="datetime1">
               <a:rPr lang="fr-FR" smtClean="0"/>
-              <a:t>11/05/2022</a:t>
+              <a:t>12/05/2022</a:t>
             </a:fld>
             <a:endParaRPr lang="fr-FR"/>
           </a:p>
@@ -5565,25 +5570,32 @@
           </a:p>
         </p:txBody>
       </p:sp>
-      <p:sp>
-        <p:nvSpPr>
-          <p:cNvPr id="3" name="Espace réservé du contenu 2"/>
-          <p:cNvSpPr>
-            <a:spLocks noGrp="1"/>
-          </p:cNvSpPr>
+      <p:pic>
+        <p:nvPicPr>
+          <p:cNvPr id="6" name="Espace réservé du contenu 5"/>
+          <p:cNvPicPr>
+            <a:picLocks noGrp="1" noChangeAspect="1"/>
+          </p:cNvPicPr>
           <p:nvPr>
             <p:ph idx="1"/>
           </p:nvPr>
-        </p:nvSpPr>
-        <p:spPr/>
-        <p:txBody>
-          <a:bodyPr/>
-          <a:lstStyle/>
-          <a:p>
-            <a:endParaRPr lang="fr-FR"/>
-          </a:p>
-        </p:txBody>
-      </p:sp>
+        </p:nvPicPr>
+        <p:blipFill>
+          <a:blip r:embed="rId2"/>
+          <a:stretch>
+            <a:fillRect/>
+          </a:stretch>
+        </p:blipFill>
+        <p:spPr>
+          <a:xfrm>
+            <a:off x="1325379" y="2664823"/>
+            <a:ext cx="9042950" cy="2246811"/>
+          </a:xfrm>
+          <a:prstGeom prst="rect">
+            <a:avLst/>
+          </a:prstGeom>
+        </p:spPr>
+      </p:pic>
       <p:sp>
         <p:nvSpPr>
           <p:cNvPr id="4" name="Espace réservé du pied de page 3"/>
@@ -5920,6 +5932,30 @@
           </a:p>
         </p:txBody>
       </p:sp>
+      <p:pic>
+        <p:nvPicPr>
+          <p:cNvPr id="6" name="Image 5"/>
+          <p:cNvPicPr>
+            <a:picLocks noChangeAspect="1"/>
+          </p:cNvPicPr>
+          <p:nvPr/>
+        </p:nvPicPr>
+        <p:blipFill>
+          <a:blip r:embed="rId2"/>
+          <a:stretch>
+            <a:fillRect/>
+          </a:stretch>
+        </p:blipFill>
+        <p:spPr>
+          <a:xfrm>
+            <a:off x="2976562" y="2676525"/>
+            <a:ext cx="6238875" cy="1504950"/>
+          </a:xfrm>
+          <a:prstGeom prst="rect">
+            <a:avLst/>
+          </a:prstGeom>
+        </p:spPr>
+      </p:pic>
     </p:spTree>
     <p:extLst>
       <p:ext uri="{BB962C8B-B14F-4D97-AF65-F5344CB8AC3E}">

</xml_diff>

<commit_message>
enlever style dans html
</commit_message>
<xml_diff>
--- a/annexe/Rapport d’optimisation SEO.pptx
+++ b/annexe/Rapport d’optimisation SEO.pptx
@@ -5,7 +5,7 @@
     <p:sldMasterId id="2147483754" r:id="rId1"/>
   </p:sldMasterIdLst>
   <p:notesMasterIdLst>
-    <p:notesMasterId r:id="rId18"/>
+    <p:notesMasterId r:id="rId22"/>
   </p:notesMasterIdLst>
   <p:sldIdLst>
     <p:sldId id="256" r:id="rId2"/>
@@ -24,6 +24,10 @@
     <p:sldId id="270" r:id="rId15"/>
     <p:sldId id="269" r:id="rId16"/>
     <p:sldId id="271" r:id="rId17"/>
+    <p:sldId id="272" r:id="rId18"/>
+    <p:sldId id="274" r:id="rId19"/>
+    <p:sldId id="273" r:id="rId20"/>
+    <p:sldId id="275" r:id="rId21"/>
   </p:sldIdLst>
   <p:sldSz cx="12192000" cy="6858000"/>
   <p:notesSz cx="6858000" cy="9144000"/>
@@ -212,7 +216,7 @@
           <a:p>
             <a:fld id="{C035DD28-074E-46BB-BB2A-B386588DC0A3}" type="datetimeFigureOut">
               <a:rPr lang="fr-FR" smtClean="0"/>
-              <a:t>12/05/2022</a:t>
+              <a:t>14/05/2022</a:t>
             </a:fld>
             <a:endParaRPr lang="fr-FR"/>
           </a:p>
@@ -706,7 +710,7 @@
           <a:p>
             <a:fld id="{232284FA-CDEF-47C7-9649-825EF76D837B}" type="datetime1">
               <a:rPr lang="fr-FR" smtClean="0"/>
-              <a:t>12/05/2022</a:t>
+              <a:t>14/05/2022</a:t>
             </a:fld>
             <a:endParaRPr lang="fr-FR"/>
           </a:p>
@@ -918,7 +922,7 @@
           <a:p>
             <a:fld id="{EB939044-10EE-4D69-A637-FE5668AB6566}" type="datetime1">
               <a:rPr lang="fr-FR" smtClean="0"/>
-              <a:t>12/05/2022</a:t>
+              <a:t>14/05/2022</a:t>
             </a:fld>
             <a:endParaRPr lang="fr-FR"/>
           </a:p>
@@ -1178,7 +1182,7 @@
           <a:p>
             <a:fld id="{F369904B-BFA1-4CB6-9D36-E6A5662F326C}" type="datetime1">
               <a:rPr lang="fr-FR" smtClean="0"/>
-              <a:t>12/05/2022</a:t>
+              <a:t>14/05/2022</a:t>
             </a:fld>
             <a:endParaRPr lang="fr-FR"/>
           </a:p>
@@ -1356,7 +1360,7 @@
           <a:p>
             <a:fld id="{0730848C-3CE0-4CC2-8087-EC38CC86EF6C}" type="datetime1">
               <a:rPr lang="fr-FR" smtClean="0"/>
-              <a:t>12/05/2022</a:t>
+              <a:t>14/05/2022</a:t>
             </a:fld>
             <a:endParaRPr lang="fr-FR"/>
           </a:p>
@@ -1695,7 +1699,7 @@
           <a:p>
             <a:fld id="{B8A20B26-26B4-45B0-877C-13FC14AC82B7}" type="datetime1">
               <a:rPr lang="fr-FR" smtClean="0"/>
-              <a:t>12/05/2022</a:t>
+              <a:t>14/05/2022</a:t>
             </a:fld>
             <a:endParaRPr lang="fr-FR"/>
           </a:p>
@@ -1974,7 +1978,7 @@
           <a:p>
             <a:fld id="{53AE2F20-6291-4792-A678-9329E1F4619E}" type="datetime1">
               <a:rPr lang="fr-FR" smtClean="0"/>
-              <a:t>12/05/2022</a:t>
+              <a:t>14/05/2022</a:t>
             </a:fld>
             <a:endParaRPr lang="fr-FR"/>
           </a:p>
@@ -2357,7 +2361,7 @@
           <a:p>
             <a:fld id="{8389FEA3-8F85-4BE5-838D-F7E922FC5021}" type="datetime1">
               <a:rPr lang="fr-FR" smtClean="0"/>
-              <a:t>12/05/2022</a:t>
+              <a:t>14/05/2022</a:t>
             </a:fld>
             <a:endParaRPr lang="fr-FR"/>
           </a:p>
@@ -2479,7 +2483,7 @@
           <a:p>
             <a:fld id="{77D894C5-B7FD-4313-AAD5-DF6E83B03D2E}" type="datetime1">
               <a:rPr lang="fr-FR" smtClean="0"/>
-              <a:t>12/05/2022</a:t>
+              <a:t>14/05/2022</a:t>
             </a:fld>
             <a:endParaRPr lang="fr-FR"/>
           </a:p>
@@ -2654,7 +2658,7 @@
           <a:p>
             <a:fld id="{75D5CE15-306C-42B4-8642-07A657F9B459}" type="datetime1">
               <a:rPr lang="fr-FR" smtClean="0"/>
-              <a:t>12/05/2022</a:t>
+              <a:t>14/05/2022</a:t>
             </a:fld>
             <a:endParaRPr lang="fr-FR"/>
           </a:p>
@@ -3012,7 +3016,7 @@
           <a:p>
             <a:fld id="{78AB5598-D849-4415-AE3D-BC67E0104DD1}" type="datetime1">
               <a:rPr lang="fr-FR" smtClean="0"/>
-              <a:t>12/05/2022</a:t>
+              <a:t>14/05/2022</a:t>
             </a:fld>
             <a:endParaRPr lang="fr-FR"/>
           </a:p>
@@ -3398,7 +3402,7 @@
           <a:p>
             <a:fld id="{536DC368-B62D-4E14-ADCA-2529D5A64AA9}" type="datetime1">
               <a:rPr lang="fr-FR" smtClean="0"/>
-              <a:t>12/05/2022</a:t>
+              <a:t>14/05/2022</a:t>
             </a:fld>
             <a:endParaRPr lang="fr-FR"/>
           </a:p>
@@ -3689,7 +3693,7 @@
           <a:p>
             <a:fld id="{62171F59-CF8D-4AD7-B611-51121FD54B58}" type="datetime1">
               <a:rPr lang="fr-FR" smtClean="0"/>
-              <a:t>12/05/2022</a:t>
+              <a:t>14/05/2022</a:t>
             </a:fld>
             <a:endParaRPr lang="fr-FR"/>
           </a:p>
@@ -4257,7 +4261,35 @@
           <a:bodyPr/>
           <a:lstStyle/>
           <a:p>
-            <a:endParaRPr lang="fr-FR"/>
+            <a:pPr algn="ctr"/>
+            <a:r>
+              <a:rPr lang="fr-FR" dirty="0" smtClean="0">
+                <a:solidFill>
+                  <a:schemeClr val="tx1"/>
+                </a:solidFill>
+              </a:rPr>
+              <a:t>AYMERIC SANDOZ</a:t>
+            </a:r>
+            <a:br>
+              <a:rPr lang="fr-FR" dirty="0" smtClean="0">
+                <a:solidFill>
+                  <a:schemeClr val="tx1"/>
+                </a:solidFill>
+              </a:rPr>
+            </a:br>
+            <a:r>
+              <a:rPr lang="fr-FR" dirty="0" smtClean="0">
+                <a:solidFill>
+                  <a:schemeClr val="tx1"/>
+                </a:solidFill>
+              </a:rPr>
+              <a:t>23 MAI 2022</a:t>
+            </a:r>
+            <a:endParaRPr lang="fr-FR" dirty="0">
+              <a:solidFill>
+                <a:schemeClr val="tx1"/>
+              </a:solidFill>
+            </a:endParaRPr>
           </a:p>
         </p:txBody>
       </p:sp>
@@ -5462,7 +5494,7 @@
         </p:blipFill>
         <p:spPr>
           <a:xfrm>
-            <a:off x="235131" y="1845734"/>
+            <a:off x="288676" y="2289276"/>
             <a:ext cx="8439150" cy="4350077"/>
           </a:xfrm>
           <a:prstGeom prst="rect">
@@ -5486,7 +5518,7 @@
         </p:blipFill>
         <p:spPr>
           <a:xfrm>
-            <a:off x="2176462" y="2233612"/>
+            <a:off x="3983977" y="-84703"/>
             <a:ext cx="7839075" cy="2390775"/>
           </a:xfrm>
           <a:prstGeom prst="rect">
@@ -5510,7 +5542,7 @@
         </p:blipFill>
         <p:spPr>
           <a:xfrm>
-            <a:off x="3476625" y="1381125"/>
+            <a:off x="6725534" y="1737360"/>
             <a:ext cx="5238750" cy="4095750"/>
           </a:xfrm>
           <a:prstGeom prst="rect">
@@ -5588,7 +5620,7 @@
         </p:blipFill>
         <p:spPr>
           <a:xfrm>
-            <a:off x="1325379" y="2664823"/>
+            <a:off x="698362" y="2664823"/>
             <a:ext cx="9042950" cy="2246811"/>
           </a:xfrm>
           <a:prstGeom prst="rect">
@@ -5713,7 +5745,7 @@
         </p:blipFill>
         <p:spPr>
           <a:xfrm>
-            <a:off x="1809379" y="1846263"/>
+            <a:off x="1266891" y="56921"/>
             <a:ext cx="8633567" cy="4022725"/>
           </a:xfrm>
           <a:prstGeom prst="rect">
@@ -5783,7 +5815,7 @@
         </p:blipFill>
         <p:spPr>
           <a:xfrm>
-            <a:off x="2176462" y="2000250"/>
+            <a:off x="340452" y="3840966"/>
             <a:ext cx="7839075" cy="2857500"/>
           </a:xfrm>
           <a:prstGeom prst="rect">
@@ -5807,7 +5839,7 @@
         </p:blipFill>
         <p:spPr>
           <a:xfrm>
-            <a:off x="3443287" y="1338262"/>
+            <a:off x="6453253" y="2151866"/>
             <a:ext cx="5305425" cy="4181475"/>
           </a:xfrm>
           <a:prstGeom prst="rect">
@@ -5969,9 +6001,444 @@
 </p:sld>
 </file>
 
+<file path=ppt/slides/slide17.xml><?xml version="1.0" encoding="utf-8"?>
+<p:sld xmlns:a="http://schemas.openxmlformats.org/drawingml/2006/main" xmlns:r="http://schemas.openxmlformats.org/officeDocument/2006/relationships" xmlns:p="http://schemas.openxmlformats.org/presentationml/2006/main">
+  <p:cSld>
+    <p:spTree>
+      <p:nvGrpSpPr>
+        <p:cNvPr id="1" name=""/>
+        <p:cNvGrpSpPr/>
+        <p:nvPr/>
+      </p:nvGrpSpPr>
+      <p:grpSpPr>
+        <a:xfrm>
+          <a:off x="0" y="0"/>
+          <a:ext cx="0" cy="0"/>
+          <a:chOff x="0" y="0"/>
+          <a:chExt cx="0" cy="0"/>
+        </a:xfrm>
+      </p:grpSpPr>
+      <p:sp>
+        <p:nvSpPr>
+          <p:cNvPr id="2" name="Titre 1"/>
+          <p:cNvSpPr>
+            <a:spLocks noGrp="1"/>
+          </p:cNvSpPr>
+          <p:nvPr>
+            <p:ph type="title"/>
+          </p:nvPr>
+        </p:nvSpPr>
+        <p:spPr/>
+        <p:txBody>
+          <a:bodyPr/>
+          <a:lstStyle/>
+          <a:p>
+            <a:pPr algn="ctr"/>
+            <a:r>
+              <a:rPr lang="fr-FR" dirty="0" smtClean="0"/>
+              <a:t>Index Avant </a:t>
+            </a:r>
+            <a:endParaRPr lang="fr-FR" dirty="0"/>
+          </a:p>
+        </p:txBody>
+      </p:sp>
+      <p:sp>
+        <p:nvSpPr>
+          <p:cNvPr id="3" name="Espace réservé du contenu 2"/>
+          <p:cNvSpPr>
+            <a:spLocks noGrp="1"/>
+          </p:cNvSpPr>
+          <p:nvPr>
+            <p:ph idx="1"/>
+          </p:nvPr>
+        </p:nvSpPr>
+        <p:spPr/>
+        <p:txBody>
+          <a:bodyPr/>
+          <a:lstStyle/>
+          <a:p>
+            <a:endParaRPr lang="fr-FR"/>
+          </a:p>
+        </p:txBody>
+      </p:sp>
+      <p:sp>
+        <p:nvSpPr>
+          <p:cNvPr id="4" name="Espace réservé du pied de page 3"/>
+          <p:cNvSpPr>
+            <a:spLocks noGrp="1"/>
+          </p:cNvSpPr>
+          <p:nvPr>
+            <p:ph type="ftr" sz="quarter" idx="11"/>
+          </p:nvPr>
+        </p:nvSpPr>
+        <p:spPr/>
+        <p:txBody>
+          <a:bodyPr/>
+          <a:lstStyle/>
+          <a:p>
+            <a:r>
+              <a:rPr lang="fr-FR" smtClean="0"/>
+              <a:t>Audit-SEO-Aymeric-Sandoz</a:t>
+            </a:r>
+            <a:endParaRPr lang="fr-FR"/>
+          </a:p>
+        </p:txBody>
+      </p:sp>
+      <p:sp>
+        <p:nvSpPr>
+          <p:cNvPr id="5" name="Espace réservé du numéro de diapositive 4"/>
+          <p:cNvSpPr>
+            <a:spLocks noGrp="1"/>
+          </p:cNvSpPr>
+          <p:nvPr>
+            <p:ph type="sldNum" sz="quarter" idx="12"/>
+          </p:nvPr>
+        </p:nvSpPr>
+        <p:spPr/>
+        <p:txBody>
+          <a:bodyPr/>
+          <a:lstStyle/>
+          <a:p>
+            <a:fld id="{92ECF272-8E12-4056-A1BB-D9C81DD1199A}" type="slidenum">
+              <a:rPr lang="fr-FR" smtClean="0"/>
+              <a:t>17</a:t>
+            </a:fld>
+            <a:endParaRPr lang="fr-FR"/>
+          </a:p>
+        </p:txBody>
+      </p:sp>
+      <p:pic>
+        <p:nvPicPr>
+          <p:cNvPr id="6" name="Image 5"/>
+          <p:cNvPicPr>
+            <a:picLocks noChangeAspect="1"/>
+          </p:cNvPicPr>
+          <p:nvPr/>
+        </p:nvPicPr>
+        <p:blipFill>
+          <a:blip r:embed="rId2"/>
+          <a:stretch>
+            <a:fillRect/>
+          </a:stretch>
+        </p:blipFill>
+        <p:spPr>
+          <a:xfrm>
+            <a:off x="1597786" y="2508070"/>
+            <a:ext cx="8302672" cy="1898876"/>
+          </a:xfrm>
+          <a:prstGeom prst="rect">
+            <a:avLst/>
+          </a:prstGeom>
+        </p:spPr>
+      </p:pic>
+    </p:spTree>
+    <p:extLst>
+      <p:ext uri="{BB962C8B-B14F-4D97-AF65-F5344CB8AC3E}">
+        <p14:creationId xmlns:p14="http://schemas.microsoft.com/office/powerpoint/2010/main" val="2313563819"/>
+      </p:ext>
+    </p:extLst>
+  </p:cSld>
+  <p:clrMapOvr>
+    <a:masterClrMapping/>
+  </p:clrMapOvr>
+</p:sld>
+</file>
+
+<file path=ppt/slides/slide18.xml><?xml version="1.0" encoding="utf-8"?>
+<p:sld xmlns:a="http://schemas.openxmlformats.org/drawingml/2006/main" xmlns:r="http://schemas.openxmlformats.org/officeDocument/2006/relationships" xmlns:p="http://schemas.openxmlformats.org/presentationml/2006/main">
+  <p:cSld>
+    <p:spTree>
+      <p:nvGrpSpPr>
+        <p:cNvPr id="1" name=""/>
+        <p:cNvGrpSpPr/>
+        <p:nvPr/>
+      </p:nvGrpSpPr>
+      <p:grpSpPr>
+        <a:xfrm>
+          <a:off x="0" y="0"/>
+          <a:ext cx="0" cy="0"/>
+          <a:chOff x="0" y="0"/>
+          <a:chExt cx="0" cy="0"/>
+        </a:xfrm>
+      </p:grpSpPr>
+      <p:sp>
+        <p:nvSpPr>
+          <p:cNvPr id="2" name="Titre 1"/>
+          <p:cNvSpPr>
+            <a:spLocks noGrp="1"/>
+          </p:cNvSpPr>
+          <p:nvPr>
+            <p:ph type="title"/>
+          </p:nvPr>
+        </p:nvSpPr>
+        <p:spPr/>
+        <p:txBody>
+          <a:bodyPr/>
+          <a:lstStyle/>
+          <a:p>
+            <a:pPr algn="ctr"/>
+            <a:r>
+              <a:rPr lang="fr-FR" dirty="0" smtClean="0"/>
+              <a:t>Index Avant </a:t>
+            </a:r>
+            <a:endParaRPr lang="fr-FR" dirty="0"/>
+          </a:p>
+        </p:txBody>
+      </p:sp>
+      <p:sp>
+        <p:nvSpPr>
+          <p:cNvPr id="3" name="Espace réservé du contenu 2"/>
+          <p:cNvSpPr>
+            <a:spLocks noGrp="1"/>
+          </p:cNvSpPr>
+          <p:nvPr>
+            <p:ph idx="1"/>
+          </p:nvPr>
+        </p:nvSpPr>
+        <p:spPr/>
+        <p:txBody>
+          <a:bodyPr/>
+          <a:lstStyle/>
+          <a:p>
+            <a:endParaRPr lang="fr-FR"/>
+          </a:p>
+        </p:txBody>
+      </p:sp>
+      <p:sp>
+        <p:nvSpPr>
+          <p:cNvPr id="4" name="Espace réservé du pied de page 3"/>
+          <p:cNvSpPr>
+            <a:spLocks noGrp="1"/>
+          </p:cNvSpPr>
+          <p:nvPr>
+            <p:ph type="ftr" sz="quarter" idx="11"/>
+          </p:nvPr>
+        </p:nvSpPr>
+        <p:spPr/>
+        <p:txBody>
+          <a:bodyPr/>
+          <a:lstStyle/>
+          <a:p>
+            <a:r>
+              <a:rPr lang="fr-FR" smtClean="0"/>
+              <a:t>Audit-SEO-Aymeric-Sandoz</a:t>
+            </a:r>
+            <a:endParaRPr lang="fr-FR"/>
+          </a:p>
+        </p:txBody>
+      </p:sp>
+      <p:sp>
+        <p:nvSpPr>
+          <p:cNvPr id="5" name="Espace réservé du numéro de diapositive 4"/>
+          <p:cNvSpPr>
+            <a:spLocks noGrp="1"/>
+          </p:cNvSpPr>
+          <p:nvPr>
+            <p:ph type="sldNum" sz="quarter" idx="12"/>
+          </p:nvPr>
+        </p:nvSpPr>
+        <p:spPr/>
+        <p:txBody>
+          <a:bodyPr/>
+          <a:lstStyle/>
+          <a:p>
+            <a:fld id="{92ECF272-8E12-4056-A1BB-D9C81DD1199A}" type="slidenum">
+              <a:rPr lang="fr-FR" smtClean="0"/>
+              <a:t>18</a:t>
+            </a:fld>
+            <a:endParaRPr lang="fr-FR"/>
+          </a:p>
+        </p:txBody>
+      </p:sp>
+      <p:pic>
+        <p:nvPicPr>
+          <p:cNvPr id="6" name="Image 5"/>
+          <p:cNvPicPr>
+            <a:picLocks noChangeAspect="1"/>
+          </p:cNvPicPr>
+          <p:nvPr/>
+        </p:nvPicPr>
+        <p:blipFill>
+          <a:blip r:embed="rId2"/>
+          <a:stretch>
+            <a:fillRect/>
+          </a:stretch>
+        </p:blipFill>
+        <p:spPr>
+          <a:xfrm>
+            <a:off x="3076575" y="2738437"/>
+            <a:ext cx="6038850" cy="1381125"/>
+          </a:xfrm>
+          <a:prstGeom prst="rect">
+            <a:avLst/>
+          </a:prstGeom>
+        </p:spPr>
+      </p:pic>
+    </p:spTree>
+    <p:extLst>
+      <p:ext uri="{BB962C8B-B14F-4D97-AF65-F5344CB8AC3E}">
+        <p14:creationId xmlns:p14="http://schemas.microsoft.com/office/powerpoint/2010/main" val="3608274868"/>
+      </p:ext>
+    </p:extLst>
+  </p:cSld>
+  <p:clrMapOvr>
+    <a:masterClrMapping/>
+  </p:clrMapOvr>
+</p:sld>
+</file>
+
+<file path=ppt/slides/slide19.xml><?xml version="1.0" encoding="utf-8"?>
+<p:sld xmlns:a="http://schemas.openxmlformats.org/drawingml/2006/main" xmlns:r="http://schemas.openxmlformats.org/officeDocument/2006/relationships" xmlns:p="http://schemas.openxmlformats.org/presentationml/2006/main">
+  <p:cSld>
+    <p:spTree>
+      <p:nvGrpSpPr>
+        <p:cNvPr id="1" name=""/>
+        <p:cNvGrpSpPr/>
+        <p:nvPr/>
+      </p:nvGrpSpPr>
+      <p:grpSpPr>
+        <a:xfrm>
+          <a:off x="0" y="0"/>
+          <a:ext cx="0" cy="0"/>
+          <a:chOff x="0" y="0"/>
+          <a:chExt cx="0" cy="0"/>
+        </a:xfrm>
+      </p:grpSpPr>
+      <p:sp>
+        <p:nvSpPr>
+          <p:cNvPr id="2" name="Titre 1"/>
+          <p:cNvSpPr>
+            <a:spLocks noGrp="1"/>
+          </p:cNvSpPr>
+          <p:nvPr>
+            <p:ph type="title"/>
+          </p:nvPr>
+        </p:nvSpPr>
+        <p:spPr/>
+        <p:txBody>
+          <a:bodyPr/>
+          <a:lstStyle/>
+          <a:p>
+            <a:r>
+              <a:rPr lang="fr-FR" dirty="0" smtClean="0"/>
+              <a:t>Contact avant </a:t>
+            </a:r>
+            <a:endParaRPr lang="fr-FR" dirty="0"/>
+          </a:p>
+        </p:txBody>
+      </p:sp>
+      <p:sp>
+        <p:nvSpPr>
+          <p:cNvPr id="3" name="Espace réservé du contenu 2"/>
+          <p:cNvSpPr>
+            <a:spLocks noGrp="1"/>
+          </p:cNvSpPr>
+          <p:nvPr>
+            <p:ph idx="1"/>
+          </p:nvPr>
+        </p:nvSpPr>
+        <p:spPr/>
+        <p:txBody>
+          <a:bodyPr/>
+          <a:lstStyle/>
+          <a:p>
+            <a:endParaRPr lang="fr-FR"/>
+          </a:p>
+        </p:txBody>
+      </p:sp>
+      <p:sp>
+        <p:nvSpPr>
+          <p:cNvPr id="4" name="Espace réservé du pied de page 3"/>
+          <p:cNvSpPr>
+            <a:spLocks noGrp="1"/>
+          </p:cNvSpPr>
+          <p:nvPr>
+            <p:ph type="ftr" sz="quarter" idx="11"/>
+          </p:nvPr>
+        </p:nvSpPr>
+        <p:spPr/>
+        <p:txBody>
+          <a:bodyPr/>
+          <a:lstStyle/>
+          <a:p>
+            <a:r>
+              <a:rPr lang="fr-FR" smtClean="0"/>
+              <a:t>Audit-SEO-Aymeric-Sandoz</a:t>
+            </a:r>
+            <a:endParaRPr lang="fr-FR"/>
+          </a:p>
+        </p:txBody>
+      </p:sp>
+      <p:sp>
+        <p:nvSpPr>
+          <p:cNvPr id="5" name="Espace réservé du numéro de diapositive 4"/>
+          <p:cNvSpPr>
+            <a:spLocks noGrp="1"/>
+          </p:cNvSpPr>
+          <p:nvPr>
+            <p:ph type="sldNum" sz="quarter" idx="12"/>
+          </p:nvPr>
+        </p:nvSpPr>
+        <p:spPr/>
+        <p:txBody>
+          <a:bodyPr/>
+          <a:lstStyle/>
+          <a:p>
+            <a:fld id="{92ECF272-8E12-4056-A1BB-D9C81DD1199A}" type="slidenum">
+              <a:rPr lang="fr-FR" smtClean="0"/>
+              <a:t>19</a:t>
+            </a:fld>
+            <a:endParaRPr lang="fr-FR"/>
+          </a:p>
+        </p:txBody>
+      </p:sp>
+    </p:spTree>
+    <p:extLst>
+      <p:ext uri="{BB962C8B-B14F-4D97-AF65-F5344CB8AC3E}">
+        <p14:creationId xmlns:p14="http://schemas.microsoft.com/office/powerpoint/2010/main" val="3383181962"/>
+      </p:ext>
+    </p:extLst>
+  </p:cSld>
+  <p:clrMapOvr>
+    <a:masterClrMapping/>
+  </p:clrMapOvr>
+</p:sld>
+</file>
+
 <file path=ppt/slides/slide2.xml><?xml version="1.0" encoding="utf-8"?>
 <p:sld xmlns:a="http://schemas.openxmlformats.org/drawingml/2006/main" xmlns:r="http://schemas.openxmlformats.org/officeDocument/2006/relationships" xmlns:p="http://schemas.openxmlformats.org/presentationml/2006/main">
   <p:cSld>
+    <p:bg>
+      <p:bgPr>
+        <a:gradFill rotWithShape="1">
+          <a:gsLst>
+            <a:gs pos="0">
+              <a:schemeClr val="bg1">
+                <a:tint val="96000"/>
+                <a:shade val="99000"/>
+                <a:satMod val="140000"/>
+              </a:schemeClr>
+            </a:gs>
+            <a:gs pos="60000">
+              <a:schemeClr val="bg1">
+                <a:tint val="100000"/>
+                <a:shade val="80000"/>
+                <a:satMod val="130000"/>
+              </a:schemeClr>
+            </a:gs>
+            <a:gs pos="100000">
+              <a:schemeClr val="bg1">
+                <a:tint val="100000"/>
+                <a:shade val="48000"/>
+                <a:satMod val="120000"/>
+              </a:schemeClr>
+            </a:gs>
+          </a:gsLst>
+          <a:lin ang="16200000" scaled="0"/>
+        </a:gradFill>
+        <a:effectLst/>
+      </p:bgPr>
+    </p:bg>
     <p:spTree>
       <p:nvGrpSpPr>
         <p:cNvPr id="1" name=""/>
@@ -6400,6 +6867,149 @@
     <p:extLst>
       <p:ext uri="{BB962C8B-B14F-4D97-AF65-F5344CB8AC3E}">
         <p14:creationId xmlns:p14="http://schemas.microsoft.com/office/powerpoint/2010/main" val="2490551873"/>
+      </p:ext>
+    </p:extLst>
+  </p:cSld>
+  <p:clrMapOvr>
+    <a:masterClrMapping/>
+  </p:clrMapOvr>
+</p:sld>
+</file>
+
+<file path=ppt/slides/slide20.xml><?xml version="1.0" encoding="utf-8"?>
+<p:sld xmlns:a="http://schemas.openxmlformats.org/drawingml/2006/main" xmlns:r="http://schemas.openxmlformats.org/officeDocument/2006/relationships" xmlns:p="http://schemas.openxmlformats.org/presentationml/2006/main">
+  <p:cSld>
+    <p:spTree>
+      <p:nvGrpSpPr>
+        <p:cNvPr id="1" name=""/>
+        <p:cNvGrpSpPr/>
+        <p:nvPr/>
+      </p:nvGrpSpPr>
+      <p:grpSpPr>
+        <a:xfrm>
+          <a:off x="0" y="0"/>
+          <a:ext cx="0" cy="0"/>
+          <a:chOff x="0" y="0"/>
+          <a:chExt cx="0" cy="0"/>
+        </a:xfrm>
+      </p:grpSpPr>
+      <p:sp>
+        <p:nvSpPr>
+          <p:cNvPr id="2" name="Titre 1"/>
+          <p:cNvSpPr>
+            <a:spLocks noGrp="1"/>
+          </p:cNvSpPr>
+          <p:nvPr>
+            <p:ph type="title"/>
+          </p:nvPr>
+        </p:nvSpPr>
+        <p:spPr/>
+        <p:txBody>
+          <a:bodyPr/>
+          <a:lstStyle/>
+          <a:p>
+            <a:pPr algn="ctr"/>
+            <a:r>
+              <a:rPr lang="fr-FR" dirty="0" smtClean="0"/>
+              <a:t>Contact avant </a:t>
+            </a:r>
+            <a:endParaRPr lang="fr-FR" dirty="0"/>
+          </a:p>
+        </p:txBody>
+      </p:sp>
+      <p:sp>
+        <p:nvSpPr>
+          <p:cNvPr id="3" name="Espace réservé du contenu 2"/>
+          <p:cNvSpPr>
+            <a:spLocks noGrp="1"/>
+          </p:cNvSpPr>
+          <p:nvPr>
+            <p:ph idx="1"/>
+          </p:nvPr>
+        </p:nvSpPr>
+        <p:spPr/>
+        <p:txBody>
+          <a:bodyPr/>
+          <a:lstStyle/>
+          <a:p>
+            <a:endParaRPr lang="fr-FR"/>
+          </a:p>
+        </p:txBody>
+      </p:sp>
+      <p:sp>
+        <p:nvSpPr>
+          <p:cNvPr id="4" name="Espace réservé du pied de page 3"/>
+          <p:cNvSpPr>
+            <a:spLocks noGrp="1"/>
+          </p:cNvSpPr>
+          <p:nvPr>
+            <p:ph type="ftr" sz="quarter" idx="11"/>
+          </p:nvPr>
+        </p:nvSpPr>
+        <p:spPr/>
+        <p:txBody>
+          <a:bodyPr/>
+          <a:lstStyle/>
+          <a:p>
+            <a:r>
+              <a:rPr lang="fr-FR" smtClean="0"/>
+              <a:t>Audit-SEO-Aymeric-Sandoz</a:t>
+            </a:r>
+            <a:endParaRPr lang="fr-FR"/>
+          </a:p>
+        </p:txBody>
+      </p:sp>
+      <p:sp>
+        <p:nvSpPr>
+          <p:cNvPr id="5" name="Espace réservé du numéro de diapositive 4"/>
+          <p:cNvSpPr>
+            <a:spLocks noGrp="1"/>
+          </p:cNvSpPr>
+          <p:nvPr>
+            <p:ph type="sldNum" sz="quarter" idx="12"/>
+          </p:nvPr>
+        </p:nvSpPr>
+        <p:spPr/>
+        <p:txBody>
+          <a:bodyPr/>
+          <a:lstStyle/>
+          <a:p>
+            <a:fld id="{92ECF272-8E12-4056-A1BB-D9C81DD1199A}" type="slidenum">
+              <a:rPr lang="fr-FR" smtClean="0"/>
+              <a:t>20</a:t>
+            </a:fld>
+            <a:endParaRPr lang="fr-FR"/>
+          </a:p>
+        </p:txBody>
+      </p:sp>
+      <p:pic>
+        <p:nvPicPr>
+          <p:cNvPr id="6" name="Image 5"/>
+          <p:cNvPicPr>
+            <a:picLocks noChangeAspect="1"/>
+          </p:cNvPicPr>
+          <p:nvPr/>
+        </p:nvPicPr>
+        <p:blipFill>
+          <a:blip r:embed="rId2"/>
+          <a:stretch>
+            <a:fillRect/>
+          </a:stretch>
+        </p:blipFill>
+        <p:spPr>
+          <a:xfrm>
+            <a:off x="1828227" y="2181497"/>
+            <a:ext cx="6744273" cy="1971403"/>
+          </a:xfrm>
+          <a:prstGeom prst="rect">
+            <a:avLst/>
+          </a:prstGeom>
+        </p:spPr>
+      </p:pic>
+    </p:spTree>
+    <p:extLst>
+      <p:ext uri="{BB962C8B-B14F-4D97-AF65-F5344CB8AC3E}">
+        <p14:creationId xmlns:p14="http://schemas.microsoft.com/office/powerpoint/2010/main" val="1159075891"/>
       </p:ext>
     </p:extLst>
   </p:cSld>
@@ -10763,7 +11373,7 @@
 <file path=ppt/theme/theme1.xml><?xml version="1.0" encoding="utf-8"?>
 <a:theme xmlns:a="http://schemas.openxmlformats.org/drawingml/2006/main" name="Rétrospective">
   <a:themeElements>
-    <a:clrScheme name="Rétrospective">
+    <a:clrScheme name="#9356DC">
       <a:dk1>
         <a:srgbClr val="000000"/>
       </a:dk1>

</xml_diff>